<commit_message>
fix: :construction: Refactoring interface communication
TCP commuication interface does not works with latest addition
</commit_message>
<xml_diff>
--- a/doc/diagrams.pptx
+++ b/doc/diagrams.pptx
@@ -105,6 +105,11 @@
       </a:defRPr>
     </a:lvl9pPr>
   </p:defaultTextStyle>
+  <p:extLst>
+    <p:ext uri="{EFAFB233-063F-42B5-8137-9DF3F51BA10A}">
+      <p15:sldGuideLst xmlns:p15="http://schemas.microsoft.com/office/powerpoint/2012/main"/>
+    </p:ext>
+  </p:extLst>
 </p:presentation>
 </file>
 
@@ -257,7 +262,7 @@
           <a:p>
             <a:fld id="{7B6A2E7A-4D72-4211-9CD5-4EDFC3609001}" type="datetimeFigureOut">
               <a:rPr lang="en-GB" smtClean="0"/>
-              <a:t>23/11/2024</a:t>
+              <a:t>24/11/2024</a:t>
             </a:fld>
             <a:endParaRPr lang="en-GB"/>
           </a:p>
@@ -457,7 +462,7 @@
           <a:p>
             <a:fld id="{7B6A2E7A-4D72-4211-9CD5-4EDFC3609001}" type="datetimeFigureOut">
               <a:rPr lang="en-GB" smtClean="0"/>
-              <a:t>23/11/2024</a:t>
+              <a:t>24/11/2024</a:t>
             </a:fld>
             <a:endParaRPr lang="en-GB"/>
           </a:p>
@@ -667,7 +672,7 @@
           <a:p>
             <a:fld id="{7B6A2E7A-4D72-4211-9CD5-4EDFC3609001}" type="datetimeFigureOut">
               <a:rPr lang="en-GB" smtClean="0"/>
-              <a:t>23/11/2024</a:t>
+              <a:t>24/11/2024</a:t>
             </a:fld>
             <a:endParaRPr lang="en-GB"/>
           </a:p>
@@ -867,7 +872,7 @@
           <a:p>
             <a:fld id="{7B6A2E7A-4D72-4211-9CD5-4EDFC3609001}" type="datetimeFigureOut">
               <a:rPr lang="en-GB" smtClean="0"/>
-              <a:t>23/11/2024</a:t>
+              <a:t>24/11/2024</a:t>
             </a:fld>
             <a:endParaRPr lang="en-GB"/>
           </a:p>
@@ -1143,7 +1148,7 @@
           <a:p>
             <a:fld id="{7B6A2E7A-4D72-4211-9CD5-4EDFC3609001}" type="datetimeFigureOut">
               <a:rPr lang="en-GB" smtClean="0"/>
-              <a:t>23/11/2024</a:t>
+              <a:t>24/11/2024</a:t>
             </a:fld>
             <a:endParaRPr lang="en-GB"/>
           </a:p>
@@ -1411,7 +1416,7 @@
           <a:p>
             <a:fld id="{7B6A2E7A-4D72-4211-9CD5-4EDFC3609001}" type="datetimeFigureOut">
               <a:rPr lang="en-GB" smtClean="0"/>
-              <a:t>23/11/2024</a:t>
+              <a:t>24/11/2024</a:t>
             </a:fld>
             <a:endParaRPr lang="en-GB"/>
           </a:p>
@@ -1826,7 +1831,7 @@
           <a:p>
             <a:fld id="{7B6A2E7A-4D72-4211-9CD5-4EDFC3609001}" type="datetimeFigureOut">
               <a:rPr lang="en-GB" smtClean="0"/>
-              <a:t>23/11/2024</a:t>
+              <a:t>24/11/2024</a:t>
             </a:fld>
             <a:endParaRPr lang="en-GB"/>
           </a:p>
@@ -1968,7 +1973,7 @@
           <a:p>
             <a:fld id="{7B6A2E7A-4D72-4211-9CD5-4EDFC3609001}" type="datetimeFigureOut">
               <a:rPr lang="en-GB" smtClean="0"/>
-              <a:t>23/11/2024</a:t>
+              <a:t>24/11/2024</a:t>
             </a:fld>
             <a:endParaRPr lang="en-GB"/>
           </a:p>
@@ -2081,7 +2086,7 @@
           <a:p>
             <a:fld id="{7B6A2E7A-4D72-4211-9CD5-4EDFC3609001}" type="datetimeFigureOut">
               <a:rPr lang="en-GB" smtClean="0"/>
-              <a:t>23/11/2024</a:t>
+              <a:t>24/11/2024</a:t>
             </a:fld>
             <a:endParaRPr lang="en-GB"/>
           </a:p>
@@ -2394,7 +2399,7 @@
           <a:p>
             <a:fld id="{7B6A2E7A-4D72-4211-9CD5-4EDFC3609001}" type="datetimeFigureOut">
               <a:rPr lang="en-GB" smtClean="0"/>
-              <a:t>23/11/2024</a:t>
+              <a:t>24/11/2024</a:t>
             </a:fld>
             <a:endParaRPr lang="en-GB"/>
           </a:p>
@@ -2683,7 +2688,7 @@
           <a:p>
             <a:fld id="{7B6A2E7A-4D72-4211-9CD5-4EDFC3609001}" type="datetimeFigureOut">
               <a:rPr lang="en-GB" smtClean="0"/>
-              <a:t>23/11/2024</a:t>
+              <a:t>24/11/2024</a:t>
             </a:fld>
             <a:endParaRPr lang="en-GB"/>
           </a:p>
@@ -2926,7 +2931,7 @@
           <a:p>
             <a:fld id="{7B6A2E7A-4D72-4211-9CD5-4EDFC3609001}" type="datetimeFigureOut">
               <a:rPr lang="en-GB" smtClean="0"/>
-              <a:t>23/11/2024</a:t>
+              <a:t>24/11/2024</a:t>
             </a:fld>
             <a:endParaRPr lang="en-GB"/>
           </a:p>
@@ -5336,7 +5341,7 @@
                   <a:schemeClr val="accent1"/>
                 </a:solidFill>
               </a:rPr>
-              <a:t>Qube State Machine</a:t>
+              <a:t>Qube Manager State Machine</a:t>
             </a:r>
             <a:endParaRPr lang="en-GB" b="1" u="sng" dirty="0">
               <a:solidFill>

</xml_diff>

<commit_message>
feat: :construction: Adding code to the Qube Interface and Qube class
Adding new code for the init and the discover state. Added another way for handling diagnostic check error results
</commit_message>
<xml_diff>
--- a/doc/diagrams.pptx
+++ b/doc/diagrams.pptx
@@ -7,6 +7,7 @@
   <p:sldIdLst>
     <p:sldId id="256" r:id="rId2"/>
     <p:sldId id="257" r:id="rId3"/>
+    <p:sldId id="258" r:id="rId4"/>
   </p:sldIdLst>
   <p:sldSz cx="12192000" cy="6858000"/>
   <p:notesSz cx="6858000" cy="9144000"/>
@@ -262,7 +263,7 @@
           <a:p>
             <a:fld id="{7B6A2E7A-4D72-4211-9CD5-4EDFC3609001}" type="datetimeFigureOut">
               <a:rPr lang="en-GB" smtClean="0"/>
-              <a:t>24/11/2024</a:t>
+              <a:t>29/11/2024</a:t>
             </a:fld>
             <a:endParaRPr lang="en-GB"/>
           </a:p>
@@ -316,7 +317,7 @@
           <a:p>
             <a:fld id="{03EC8F07-C893-4E5E-A926-876D723FA5C9}" type="slidenum">
               <a:rPr lang="en-GB" smtClean="0"/>
-              <a:t>‹#›</a:t>
+              <a:t>‹N›</a:t>
             </a:fld>
             <a:endParaRPr lang="en-GB"/>
           </a:p>
@@ -462,7 +463,7 @@
           <a:p>
             <a:fld id="{7B6A2E7A-4D72-4211-9CD5-4EDFC3609001}" type="datetimeFigureOut">
               <a:rPr lang="en-GB" smtClean="0"/>
-              <a:t>24/11/2024</a:t>
+              <a:t>29/11/2024</a:t>
             </a:fld>
             <a:endParaRPr lang="en-GB"/>
           </a:p>
@@ -516,7 +517,7 @@
           <a:p>
             <a:fld id="{03EC8F07-C893-4E5E-A926-876D723FA5C9}" type="slidenum">
               <a:rPr lang="en-GB" smtClean="0"/>
-              <a:t>‹#›</a:t>
+              <a:t>‹N›</a:t>
             </a:fld>
             <a:endParaRPr lang="en-GB"/>
           </a:p>
@@ -672,7 +673,7 @@
           <a:p>
             <a:fld id="{7B6A2E7A-4D72-4211-9CD5-4EDFC3609001}" type="datetimeFigureOut">
               <a:rPr lang="en-GB" smtClean="0"/>
-              <a:t>24/11/2024</a:t>
+              <a:t>29/11/2024</a:t>
             </a:fld>
             <a:endParaRPr lang="en-GB"/>
           </a:p>
@@ -726,7 +727,7 @@
           <a:p>
             <a:fld id="{03EC8F07-C893-4E5E-A926-876D723FA5C9}" type="slidenum">
               <a:rPr lang="en-GB" smtClean="0"/>
-              <a:t>‹#›</a:t>
+              <a:t>‹N›</a:t>
             </a:fld>
             <a:endParaRPr lang="en-GB"/>
           </a:p>
@@ -872,7 +873,7 @@
           <a:p>
             <a:fld id="{7B6A2E7A-4D72-4211-9CD5-4EDFC3609001}" type="datetimeFigureOut">
               <a:rPr lang="en-GB" smtClean="0"/>
-              <a:t>24/11/2024</a:t>
+              <a:t>29/11/2024</a:t>
             </a:fld>
             <a:endParaRPr lang="en-GB"/>
           </a:p>
@@ -926,7 +927,7 @@
           <a:p>
             <a:fld id="{03EC8F07-C893-4E5E-A926-876D723FA5C9}" type="slidenum">
               <a:rPr lang="en-GB" smtClean="0"/>
-              <a:t>‹#›</a:t>
+              <a:t>‹N›</a:t>
             </a:fld>
             <a:endParaRPr lang="en-GB"/>
           </a:p>
@@ -1148,7 +1149,7 @@
           <a:p>
             <a:fld id="{7B6A2E7A-4D72-4211-9CD5-4EDFC3609001}" type="datetimeFigureOut">
               <a:rPr lang="en-GB" smtClean="0"/>
-              <a:t>24/11/2024</a:t>
+              <a:t>29/11/2024</a:t>
             </a:fld>
             <a:endParaRPr lang="en-GB"/>
           </a:p>
@@ -1202,7 +1203,7 @@
           <a:p>
             <a:fld id="{03EC8F07-C893-4E5E-A926-876D723FA5C9}" type="slidenum">
               <a:rPr lang="en-GB" smtClean="0"/>
-              <a:t>‹#›</a:t>
+              <a:t>‹N›</a:t>
             </a:fld>
             <a:endParaRPr lang="en-GB"/>
           </a:p>
@@ -1416,7 +1417,7 @@
           <a:p>
             <a:fld id="{7B6A2E7A-4D72-4211-9CD5-4EDFC3609001}" type="datetimeFigureOut">
               <a:rPr lang="en-GB" smtClean="0"/>
-              <a:t>24/11/2024</a:t>
+              <a:t>29/11/2024</a:t>
             </a:fld>
             <a:endParaRPr lang="en-GB"/>
           </a:p>
@@ -1470,7 +1471,7 @@
           <a:p>
             <a:fld id="{03EC8F07-C893-4E5E-A926-876D723FA5C9}" type="slidenum">
               <a:rPr lang="en-GB" smtClean="0"/>
-              <a:t>‹#›</a:t>
+              <a:t>‹N›</a:t>
             </a:fld>
             <a:endParaRPr lang="en-GB"/>
           </a:p>
@@ -1831,7 +1832,7 @@
           <a:p>
             <a:fld id="{7B6A2E7A-4D72-4211-9CD5-4EDFC3609001}" type="datetimeFigureOut">
               <a:rPr lang="en-GB" smtClean="0"/>
-              <a:t>24/11/2024</a:t>
+              <a:t>29/11/2024</a:t>
             </a:fld>
             <a:endParaRPr lang="en-GB"/>
           </a:p>
@@ -1885,7 +1886,7 @@
           <a:p>
             <a:fld id="{03EC8F07-C893-4E5E-A926-876D723FA5C9}" type="slidenum">
               <a:rPr lang="en-GB" smtClean="0"/>
-              <a:t>‹#›</a:t>
+              <a:t>‹N›</a:t>
             </a:fld>
             <a:endParaRPr lang="en-GB"/>
           </a:p>
@@ -1973,7 +1974,7 @@
           <a:p>
             <a:fld id="{7B6A2E7A-4D72-4211-9CD5-4EDFC3609001}" type="datetimeFigureOut">
               <a:rPr lang="en-GB" smtClean="0"/>
-              <a:t>24/11/2024</a:t>
+              <a:t>29/11/2024</a:t>
             </a:fld>
             <a:endParaRPr lang="en-GB"/>
           </a:p>
@@ -2027,7 +2028,7 @@
           <a:p>
             <a:fld id="{03EC8F07-C893-4E5E-A926-876D723FA5C9}" type="slidenum">
               <a:rPr lang="en-GB" smtClean="0"/>
-              <a:t>‹#›</a:t>
+              <a:t>‹N›</a:t>
             </a:fld>
             <a:endParaRPr lang="en-GB"/>
           </a:p>
@@ -2086,7 +2087,7 @@
           <a:p>
             <a:fld id="{7B6A2E7A-4D72-4211-9CD5-4EDFC3609001}" type="datetimeFigureOut">
               <a:rPr lang="en-GB" smtClean="0"/>
-              <a:t>24/11/2024</a:t>
+              <a:t>29/11/2024</a:t>
             </a:fld>
             <a:endParaRPr lang="en-GB"/>
           </a:p>
@@ -2140,7 +2141,7 @@
           <a:p>
             <a:fld id="{03EC8F07-C893-4E5E-A926-876D723FA5C9}" type="slidenum">
               <a:rPr lang="en-GB" smtClean="0"/>
-              <a:t>‹#›</a:t>
+              <a:t>‹N›</a:t>
             </a:fld>
             <a:endParaRPr lang="en-GB"/>
           </a:p>
@@ -2399,7 +2400,7 @@
           <a:p>
             <a:fld id="{7B6A2E7A-4D72-4211-9CD5-4EDFC3609001}" type="datetimeFigureOut">
               <a:rPr lang="en-GB" smtClean="0"/>
-              <a:t>24/11/2024</a:t>
+              <a:t>29/11/2024</a:t>
             </a:fld>
             <a:endParaRPr lang="en-GB"/>
           </a:p>
@@ -2453,7 +2454,7 @@
           <a:p>
             <a:fld id="{03EC8F07-C893-4E5E-A926-876D723FA5C9}" type="slidenum">
               <a:rPr lang="en-GB" smtClean="0"/>
-              <a:t>‹#›</a:t>
+              <a:t>‹N›</a:t>
             </a:fld>
             <a:endParaRPr lang="en-GB"/>
           </a:p>
@@ -2688,7 +2689,7 @@
           <a:p>
             <a:fld id="{7B6A2E7A-4D72-4211-9CD5-4EDFC3609001}" type="datetimeFigureOut">
               <a:rPr lang="en-GB" smtClean="0"/>
-              <a:t>24/11/2024</a:t>
+              <a:t>29/11/2024</a:t>
             </a:fld>
             <a:endParaRPr lang="en-GB"/>
           </a:p>
@@ -2742,7 +2743,7 @@
           <a:p>
             <a:fld id="{03EC8F07-C893-4E5E-A926-876D723FA5C9}" type="slidenum">
               <a:rPr lang="en-GB" smtClean="0"/>
-              <a:t>‹#›</a:t>
+              <a:t>‹N›</a:t>
             </a:fld>
             <a:endParaRPr lang="en-GB"/>
           </a:p>
@@ -2931,7 +2932,7 @@
           <a:p>
             <a:fld id="{7B6A2E7A-4D72-4211-9CD5-4EDFC3609001}" type="datetimeFigureOut">
               <a:rPr lang="en-GB" smtClean="0"/>
-              <a:t>24/11/2024</a:t>
+              <a:t>29/11/2024</a:t>
             </a:fld>
             <a:endParaRPr lang="en-GB"/>
           </a:p>
@@ -3021,7 +3022,7 @@
           <a:p>
             <a:fld id="{03EC8F07-C893-4E5E-A926-876D723FA5C9}" type="slidenum">
               <a:rPr lang="en-GB" smtClean="0"/>
-              <a:t>‹#›</a:t>
+              <a:t>‹N›</a:t>
             </a:fld>
             <a:endParaRPr lang="en-GB"/>
           </a:p>
@@ -5277,6 +5278,96 @@
           </a:p>
         </p:txBody>
       </p:sp>
+      <p:sp>
+        <p:nvSpPr>
+          <p:cNvPr id="2" name="Rettangolo 1">
+            <a:extLst>
+              <a:ext uri="{FF2B5EF4-FFF2-40B4-BE49-F238E27FC236}">
+                <a16:creationId xmlns:a16="http://schemas.microsoft.com/office/drawing/2014/main" id="{A83F12BE-4A09-3463-AEC6-33809D0302E8}"/>
+              </a:ext>
+            </a:extLst>
+          </p:cNvPr>
+          <p:cNvSpPr/>
+          <p:nvPr/>
+        </p:nvSpPr>
+        <p:spPr>
+          <a:xfrm>
+            <a:off x="1581150" y="1638300"/>
+            <a:ext cx="9150350" cy="4781550"/>
+          </a:xfrm>
+          <a:prstGeom prst="rect">
+            <a:avLst/>
+          </a:prstGeom>
+          <a:noFill/>
+          <a:ln w="9525" cap="flat" cmpd="sng" algn="ctr">
+            <a:solidFill>
+              <a:schemeClr val="accent1"/>
+            </a:solidFill>
+            <a:prstDash val="solid"/>
+            <a:round/>
+            <a:headEnd type="none" w="med" len="med"/>
+            <a:tailEnd type="none" w="med" len="med"/>
+          </a:ln>
+        </p:spPr>
+        <p:style>
+          <a:lnRef idx="0">
+            <a:scrgbClr r="0" g="0" b="0"/>
+          </a:lnRef>
+          <a:fillRef idx="0">
+            <a:scrgbClr r="0" g="0" b="0"/>
+          </a:fillRef>
+          <a:effectRef idx="0">
+            <a:scrgbClr r="0" g="0" b="0"/>
+          </a:effectRef>
+          <a:fontRef idx="minor">
+            <a:schemeClr val="accent1"/>
+          </a:fontRef>
+        </p:style>
+        <p:txBody>
+          <a:bodyPr rtlCol="0" anchor="ctr"/>
+          <a:lstStyle/>
+          <a:p>
+            <a:pPr algn="ctr"/>
+            <a:endParaRPr lang="it-IT"/>
+          </a:p>
+        </p:txBody>
+      </p:sp>
+      <p:sp>
+        <p:nvSpPr>
+          <p:cNvPr id="3" name="TextBox 24">
+            <a:extLst>
+              <a:ext uri="{FF2B5EF4-FFF2-40B4-BE49-F238E27FC236}">
+                <a16:creationId xmlns:a16="http://schemas.microsoft.com/office/drawing/2014/main" id="{5AFC4255-57DB-E24B-A602-2BA8983AA7E0}"/>
+              </a:ext>
+            </a:extLst>
+          </p:cNvPr>
+          <p:cNvSpPr txBox="1"/>
+          <p:nvPr/>
+        </p:nvSpPr>
+        <p:spPr>
+          <a:xfrm>
+            <a:off x="1530949" y="1362117"/>
+            <a:ext cx="900115" cy="276999"/>
+          </a:xfrm>
+          <a:prstGeom prst="rect">
+            <a:avLst/>
+          </a:prstGeom>
+          <a:noFill/>
+        </p:spPr>
+        <p:txBody>
+          <a:bodyPr wrap="square" rtlCol="0">
+            <a:spAutoFit/>
+          </a:bodyPr>
+          <a:lstStyle/>
+          <a:p>
+            <a:r>
+              <a:rPr lang="it-IT" sz="1200" b="1" dirty="0"/>
+              <a:t>Qube</a:t>
+            </a:r>
+            <a:endParaRPr lang="en-GB" sz="800" b="1" dirty="0"/>
+          </a:p>
+        </p:txBody>
+      </p:sp>
     </p:spTree>
     <p:extLst>
       <p:ext uri="{BB962C8B-B14F-4D97-AF65-F5344CB8AC3E}">
@@ -5683,7 +5774,15 @@
           <a:p>
             <a:r>
               <a:rPr lang="it-IT" sz="1000" i="1" dirty="0"/>
-              <a:t>If discover flag is enabled by conf and Qube is ready</a:t>
+              <a:t>If </a:t>
+            </a:r>
+            <a:r>
+              <a:rPr lang="it-IT" sz="1000" i="1" dirty="0" err="1"/>
+              <a:t>discover</a:t>
+            </a:r>
+            <a:r>
+              <a:rPr lang="it-IT" sz="1000" i="1" dirty="0"/>
+              <a:t> flag is enabled by conf and Qube is ready</a:t>
             </a:r>
             <a:endParaRPr lang="en-GB" sz="1000" i="1" dirty="0"/>
           </a:p>
@@ -5852,7 +5951,15 @@
           <a:p>
             <a:r>
               <a:rPr lang="it-IT" sz="1000" dirty="0"/>
-              <a:t>Given the subnet address and subnet mask discover active Qube workers in the subnet.</a:t>
+              <a:t>Given the subnet address and subnet mask </a:t>
+            </a:r>
+            <a:r>
+              <a:rPr lang="it-IT" sz="1000" dirty="0" err="1"/>
+              <a:t>discover</a:t>
+            </a:r>
+            <a:r>
+              <a:rPr lang="it-IT" sz="1000" dirty="0"/>
+              <a:t> active Qube workers in the subnet.</a:t>
             </a:r>
             <a:endParaRPr lang="en-GB" sz="1000" dirty="0"/>
           </a:p>
@@ -5888,7 +5995,15 @@
           <a:p>
             <a:r>
               <a:rPr lang="it-IT" sz="1000" i="1" dirty="0"/>
-              <a:t>If discover flag is disabled by conf and Qube is ready</a:t>
+              <a:t>If </a:t>
+            </a:r>
+            <a:r>
+              <a:rPr lang="it-IT" sz="1000" i="1" dirty="0" err="1"/>
+              <a:t>discover</a:t>
+            </a:r>
+            <a:r>
+              <a:rPr lang="it-IT" sz="1000" i="1" dirty="0"/>
+              <a:t> flag is disabled by conf and Qube is ready</a:t>
             </a:r>
             <a:endParaRPr lang="en-GB" sz="1000" i="1" dirty="0"/>
           </a:p>
@@ -7232,6 +7347,980 @@
     <p:extLst>
       <p:ext uri="{BB962C8B-B14F-4D97-AF65-F5344CB8AC3E}">
         <p14:creationId xmlns:p14="http://schemas.microsoft.com/office/powerpoint/2010/main" val="3102928882"/>
+      </p:ext>
+    </p:extLst>
+  </p:cSld>
+  <p:clrMapOvr>
+    <a:masterClrMapping/>
+  </p:clrMapOvr>
+</p:sld>
+</file>
+
+<file path=ppt/slides/slide3.xml><?xml version="1.0" encoding="utf-8"?>
+<p:sld xmlns:a="http://schemas.openxmlformats.org/drawingml/2006/main" xmlns:r="http://schemas.openxmlformats.org/officeDocument/2006/relationships" xmlns:p="http://schemas.openxmlformats.org/presentationml/2006/main">
+  <p:cSld>
+    <p:spTree>
+      <p:nvGrpSpPr>
+        <p:cNvPr id="1" name=""/>
+        <p:cNvGrpSpPr/>
+        <p:nvPr/>
+      </p:nvGrpSpPr>
+      <p:grpSpPr>
+        <a:xfrm>
+          <a:off x="0" y="0"/>
+          <a:ext cx="0" cy="0"/>
+          <a:chOff x="0" y="0"/>
+          <a:chExt cx="0" cy="0"/>
+        </a:xfrm>
+      </p:grpSpPr>
+      <p:sp>
+        <p:nvSpPr>
+          <p:cNvPr id="4" name="TextBox 3">
+            <a:extLst>
+              <a:ext uri="{FF2B5EF4-FFF2-40B4-BE49-F238E27FC236}">
+                <a16:creationId xmlns:a16="http://schemas.microsoft.com/office/drawing/2014/main" id="{279CBD04-3031-56A6-FB95-E9A0CE1EC3E3}"/>
+              </a:ext>
+            </a:extLst>
+          </p:cNvPr>
+          <p:cNvSpPr txBox="1"/>
+          <p:nvPr/>
+        </p:nvSpPr>
+        <p:spPr>
+          <a:xfrm>
+            <a:off x="293218" y="256106"/>
+            <a:ext cx="3335807" cy="369332"/>
+          </a:xfrm>
+          <a:prstGeom prst="rect">
+            <a:avLst/>
+          </a:prstGeom>
+          <a:noFill/>
+        </p:spPr>
+        <p:txBody>
+          <a:bodyPr wrap="square" rtlCol="0">
+            <a:spAutoFit/>
+          </a:bodyPr>
+          <a:lstStyle/>
+          <a:p>
+            <a:r>
+              <a:rPr lang="it-IT" b="1" u="sng" dirty="0">
+                <a:solidFill>
+                  <a:schemeClr val="accent1"/>
+                </a:solidFill>
+              </a:rPr>
+              <a:t>Discover Protocol</a:t>
+            </a:r>
+            <a:endParaRPr lang="en-GB" b="1" u="sng" dirty="0">
+              <a:solidFill>
+                <a:schemeClr val="accent1"/>
+              </a:solidFill>
+            </a:endParaRPr>
+          </a:p>
+        </p:txBody>
+      </p:sp>
+      <p:sp>
+        <p:nvSpPr>
+          <p:cNvPr id="5" name="Ovale 4">
+            <a:extLst>
+              <a:ext uri="{FF2B5EF4-FFF2-40B4-BE49-F238E27FC236}">
+                <a16:creationId xmlns:a16="http://schemas.microsoft.com/office/drawing/2014/main" id="{8F360260-D427-1EBC-45F3-981C13392BB4}"/>
+              </a:ext>
+            </a:extLst>
+          </p:cNvPr>
+          <p:cNvSpPr/>
+          <p:nvPr/>
+        </p:nvSpPr>
+        <p:spPr>
+          <a:xfrm>
+            <a:off x="2582926" y="4273042"/>
+            <a:ext cx="1664208" cy="685800"/>
+          </a:xfrm>
+          <a:prstGeom prst="ellipse">
+            <a:avLst/>
+          </a:prstGeom>
+          <a:solidFill>
+            <a:schemeClr val="tx2">
+              <a:lumMod val="50000"/>
+              <a:lumOff val="50000"/>
+            </a:schemeClr>
+          </a:solidFill>
+        </p:spPr>
+        <p:style>
+          <a:lnRef idx="2">
+            <a:schemeClr val="accent1">
+              <a:shade val="15000"/>
+            </a:schemeClr>
+          </a:lnRef>
+          <a:fillRef idx="1">
+            <a:schemeClr val="accent1"/>
+          </a:fillRef>
+          <a:effectRef idx="0">
+            <a:schemeClr val="accent1"/>
+          </a:effectRef>
+          <a:fontRef idx="minor">
+            <a:schemeClr val="lt1"/>
+          </a:fontRef>
+        </p:style>
+        <p:txBody>
+          <a:bodyPr rtlCol="0" anchor="ctr"/>
+          <a:lstStyle/>
+          <a:p>
+            <a:pPr algn="ctr"/>
+            <a:r>
+              <a:rPr lang="it-IT" sz="1400" dirty="0"/>
+              <a:t>Qube Manager</a:t>
+            </a:r>
+          </a:p>
+        </p:txBody>
+      </p:sp>
+      <p:sp>
+        <p:nvSpPr>
+          <p:cNvPr id="6" name="Ovale 5">
+            <a:extLst>
+              <a:ext uri="{FF2B5EF4-FFF2-40B4-BE49-F238E27FC236}">
+                <a16:creationId xmlns:a16="http://schemas.microsoft.com/office/drawing/2014/main" id="{E573F22F-C608-0628-3FEF-C7D3731F4695}"/>
+              </a:ext>
+            </a:extLst>
+          </p:cNvPr>
+          <p:cNvSpPr/>
+          <p:nvPr/>
+        </p:nvSpPr>
+        <p:spPr>
+          <a:xfrm>
+            <a:off x="6658102" y="3276346"/>
+            <a:ext cx="1664208" cy="685800"/>
+          </a:xfrm>
+          <a:prstGeom prst="ellipse">
+            <a:avLst/>
+          </a:prstGeom>
+          <a:solidFill>
+            <a:schemeClr val="bg2">
+              <a:lumMod val="75000"/>
+            </a:schemeClr>
+          </a:solidFill>
+        </p:spPr>
+        <p:style>
+          <a:lnRef idx="2">
+            <a:schemeClr val="accent1">
+              <a:shade val="15000"/>
+            </a:schemeClr>
+          </a:lnRef>
+          <a:fillRef idx="1">
+            <a:schemeClr val="accent1"/>
+          </a:fillRef>
+          <a:effectRef idx="0">
+            <a:schemeClr val="accent1"/>
+          </a:effectRef>
+          <a:fontRef idx="minor">
+            <a:schemeClr val="lt1"/>
+          </a:fontRef>
+        </p:style>
+        <p:txBody>
+          <a:bodyPr rtlCol="0" anchor="ctr"/>
+          <a:lstStyle/>
+          <a:p>
+            <a:pPr algn="ctr"/>
+            <a:r>
+              <a:rPr lang="it-IT" sz="1400" dirty="0"/>
+              <a:t>Qube Worker</a:t>
+            </a:r>
+          </a:p>
+        </p:txBody>
+      </p:sp>
+      <p:sp>
+        <p:nvSpPr>
+          <p:cNvPr id="7" name="Ovale 6">
+            <a:extLst>
+              <a:ext uri="{FF2B5EF4-FFF2-40B4-BE49-F238E27FC236}">
+                <a16:creationId xmlns:a16="http://schemas.microsoft.com/office/drawing/2014/main" id="{22BE70EF-2B06-FD53-2B55-AAE6112EA00E}"/>
+              </a:ext>
+            </a:extLst>
+          </p:cNvPr>
+          <p:cNvSpPr/>
+          <p:nvPr/>
+        </p:nvSpPr>
+        <p:spPr>
+          <a:xfrm>
+            <a:off x="6658102" y="4343146"/>
+            <a:ext cx="1664208" cy="685800"/>
+          </a:xfrm>
+          <a:prstGeom prst="ellipse">
+            <a:avLst/>
+          </a:prstGeom>
+          <a:solidFill>
+            <a:schemeClr val="bg2">
+              <a:lumMod val="75000"/>
+            </a:schemeClr>
+          </a:solidFill>
+        </p:spPr>
+        <p:style>
+          <a:lnRef idx="2">
+            <a:schemeClr val="accent1">
+              <a:shade val="15000"/>
+            </a:schemeClr>
+          </a:lnRef>
+          <a:fillRef idx="1">
+            <a:schemeClr val="accent1"/>
+          </a:fillRef>
+          <a:effectRef idx="0">
+            <a:schemeClr val="accent1"/>
+          </a:effectRef>
+          <a:fontRef idx="minor">
+            <a:schemeClr val="lt1"/>
+          </a:fontRef>
+        </p:style>
+        <p:txBody>
+          <a:bodyPr rtlCol="0" anchor="ctr"/>
+          <a:lstStyle/>
+          <a:p>
+            <a:pPr algn="ctr"/>
+            <a:r>
+              <a:rPr lang="it-IT" sz="1400" dirty="0"/>
+              <a:t>Qube Worker</a:t>
+            </a:r>
+          </a:p>
+        </p:txBody>
+      </p:sp>
+      <p:sp>
+        <p:nvSpPr>
+          <p:cNvPr id="8" name="Ovale 7">
+            <a:extLst>
+              <a:ext uri="{FF2B5EF4-FFF2-40B4-BE49-F238E27FC236}">
+                <a16:creationId xmlns:a16="http://schemas.microsoft.com/office/drawing/2014/main" id="{2EE8036A-45CD-B699-E9FD-DD5AEBD61563}"/>
+              </a:ext>
+            </a:extLst>
+          </p:cNvPr>
+          <p:cNvSpPr/>
+          <p:nvPr/>
+        </p:nvSpPr>
+        <p:spPr>
+          <a:xfrm>
+            <a:off x="6658102" y="5409946"/>
+            <a:ext cx="1664208" cy="685800"/>
+          </a:xfrm>
+          <a:prstGeom prst="ellipse">
+            <a:avLst/>
+          </a:prstGeom>
+          <a:solidFill>
+            <a:schemeClr val="bg2">
+              <a:lumMod val="75000"/>
+            </a:schemeClr>
+          </a:solidFill>
+        </p:spPr>
+        <p:style>
+          <a:lnRef idx="2">
+            <a:schemeClr val="accent1">
+              <a:shade val="15000"/>
+            </a:schemeClr>
+          </a:lnRef>
+          <a:fillRef idx="1">
+            <a:schemeClr val="accent1"/>
+          </a:fillRef>
+          <a:effectRef idx="0">
+            <a:schemeClr val="accent1"/>
+          </a:effectRef>
+          <a:fontRef idx="minor">
+            <a:schemeClr val="lt1"/>
+          </a:fontRef>
+        </p:style>
+        <p:txBody>
+          <a:bodyPr rtlCol="0" anchor="ctr"/>
+          <a:lstStyle/>
+          <a:p>
+            <a:pPr algn="ctr"/>
+            <a:r>
+              <a:rPr lang="it-IT" sz="1400" dirty="0"/>
+              <a:t>Qube Worker</a:t>
+            </a:r>
+          </a:p>
+        </p:txBody>
+      </p:sp>
+      <p:sp>
+        <p:nvSpPr>
+          <p:cNvPr id="9" name="TextBox 8">
+            <a:extLst>
+              <a:ext uri="{FF2B5EF4-FFF2-40B4-BE49-F238E27FC236}">
+                <a16:creationId xmlns:a16="http://schemas.microsoft.com/office/drawing/2014/main" id="{692C8205-A2FC-54E4-B682-3AF7FB375B72}"/>
+              </a:ext>
+            </a:extLst>
+          </p:cNvPr>
+          <p:cNvSpPr txBox="1"/>
+          <p:nvPr/>
+        </p:nvSpPr>
+        <p:spPr>
+          <a:xfrm>
+            <a:off x="2964972" y="5044186"/>
+            <a:ext cx="900115" cy="253916"/>
+          </a:xfrm>
+          <a:prstGeom prst="rect">
+            <a:avLst/>
+          </a:prstGeom>
+          <a:noFill/>
+        </p:spPr>
+        <p:txBody>
+          <a:bodyPr wrap="square" rtlCol="0">
+            <a:spAutoFit/>
+          </a:bodyPr>
+          <a:lstStyle/>
+          <a:p>
+            <a:r>
+              <a:rPr lang="it-IT" sz="1050" dirty="0"/>
+              <a:t>172.30.20.1</a:t>
+            </a:r>
+            <a:endParaRPr lang="en-GB" sz="1050" dirty="0"/>
+          </a:p>
+        </p:txBody>
+      </p:sp>
+      <p:sp>
+        <p:nvSpPr>
+          <p:cNvPr id="10" name="TextBox 8">
+            <a:extLst>
+              <a:ext uri="{FF2B5EF4-FFF2-40B4-BE49-F238E27FC236}">
+                <a16:creationId xmlns:a16="http://schemas.microsoft.com/office/drawing/2014/main" id="{E8F9834A-5C92-2CC9-09CF-3886506D2B0D}"/>
+              </a:ext>
+            </a:extLst>
+          </p:cNvPr>
+          <p:cNvSpPr txBox="1"/>
+          <p:nvPr/>
+        </p:nvSpPr>
+        <p:spPr>
+          <a:xfrm>
+            <a:off x="8521476" y="3496135"/>
+            <a:ext cx="900115" cy="253916"/>
+          </a:xfrm>
+          <a:prstGeom prst="rect">
+            <a:avLst/>
+          </a:prstGeom>
+          <a:noFill/>
+        </p:spPr>
+        <p:txBody>
+          <a:bodyPr wrap="square" rtlCol="0">
+            <a:spAutoFit/>
+          </a:bodyPr>
+          <a:lstStyle/>
+          <a:p>
+            <a:r>
+              <a:rPr lang="it-IT" sz="1050" dirty="0"/>
+              <a:t>172.30.10.x</a:t>
+            </a:r>
+            <a:endParaRPr lang="en-GB" sz="1050" dirty="0"/>
+          </a:p>
+        </p:txBody>
+      </p:sp>
+      <p:sp>
+        <p:nvSpPr>
+          <p:cNvPr id="11" name="TextBox 8">
+            <a:extLst>
+              <a:ext uri="{FF2B5EF4-FFF2-40B4-BE49-F238E27FC236}">
+                <a16:creationId xmlns:a16="http://schemas.microsoft.com/office/drawing/2014/main" id="{015A192C-52B8-88EA-FBB8-6A9F6649F4B9}"/>
+              </a:ext>
+            </a:extLst>
+          </p:cNvPr>
+          <p:cNvSpPr txBox="1"/>
+          <p:nvPr/>
+        </p:nvSpPr>
+        <p:spPr>
+          <a:xfrm>
+            <a:off x="8521476" y="4562935"/>
+            <a:ext cx="900115" cy="253916"/>
+          </a:xfrm>
+          <a:prstGeom prst="rect">
+            <a:avLst/>
+          </a:prstGeom>
+          <a:noFill/>
+        </p:spPr>
+        <p:txBody>
+          <a:bodyPr wrap="square" rtlCol="0">
+            <a:spAutoFit/>
+          </a:bodyPr>
+          <a:lstStyle/>
+          <a:p>
+            <a:r>
+              <a:rPr lang="it-IT" sz="1050" dirty="0"/>
+              <a:t>172.30.10.y</a:t>
+            </a:r>
+            <a:endParaRPr lang="en-GB" sz="1050" dirty="0"/>
+          </a:p>
+        </p:txBody>
+      </p:sp>
+      <p:sp>
+        <p:nvSpPr>
+          <p:cNvPr id="12" name="TextBox 8">
+            <a:extLst>
+              <a:ext uri="{FF2B5EF4-FFF2-40B4-BE49-F238E27FC236}">
+                <a16:creationId xmlns:a16="http://schemas.microsoft.com/office/drawing/2014/main" id="{818E80C0-1337-9BD9-35BC-AA5CB26B92A8}"/>
+              </a:ext>
+            </a:extLst>
+          </p:cNvPr>
+          <p:cNvSpPr txBox="1"/>
+          <p:nvPr/>
+        </p:nvSpPr>
+        <p:spPr>
+          <a:xfrm>
+            <a:off x="8521476" y="5629735"/>
+            <a:ext cx="900115" cy="253916"/>
+          </a:xfrm>
+          <a:prstGeom prst="rect">
+            <a:avLst/>
+          </a:prstGeom>
+          <a:noFill/>
+        </p:spPr>
+        <p:txBody>
+          <a:bodyPr wrap="square" rtlCol="0">
+            <a:spAutoFit/>
+          </a:bodyPr>
+          <a:lstStyle/>
+          <a:p>
+            <a:r>
+              <a:rPr lang="it-IT" sz="1050" dirty="0"/>
+              <a:t>172.30.10.z</a:t>
+            </a:r>
+            <a:endParaRPr lang="en-GB" sz="1050" dirty="0"/>
+          </a:p>
+        </p:txBody>
+      </p:sp>
+      <p:cxnSp>
+        <p:nvCxnSpPr>
+          <p:cNvPr id="14" name="Connettore 2 13">
+            <a:extLst>
+              <a:ext uri="{FF2B5EF4-FFF2-40B4-BE49-F238E27FC236}">
+                <a16:creationId xmlns:a16="http://schemas.microsoft.com/office/drawing/2014/main" id="{4307F9A8-F91E-3A88-7229-384F4E6989F8}"/>
+              </a:ext>
+            </a:extLst>
+          </p:cNvPr>
+          <p:cNvCxnSpPr>
+            <a:cxnSpLocks/>
+            <a:stCxn id="5" idx="7"/>
+            <a:endCxn id="6" idx="2"/>
+          </p:cNvCxnSpPr>
+          <p:nvPr/>
+        </p:nvCxnSpPr>
+        <p:spPr>
+          <a:xfrm flipV="1">
+            <a:off x="4003416" y="3619246"/>
+            <a:ext cx="2654686" cy="754229"/>
+          </a:xfrm>
+          <a:prstGeom prst="straightConnector1">
+            <a:avLst/>
+          </a:prstGeom>
+          <a:ln w="19050" cap="flat" cmpd="sng" algn="ctr">
+            <a:solidFill>
+              <a:schemeClr val="dk1"/>
+            </a:solidFill>
+            <a:prstDash val="solid"/>
+            <a:round/>
+            <a:headEnd type="arrow" w="med" len="med"/>
+            <a:tailEnd type="arrow" w="med" len="med"/>
+          </a:ln>
+        </p:spPr>
+        <p:style>
+          <a:lnRef idx="0">
+            <a:scrgbClr r="0" g="0" b="0"/>
+          </a:lnRef>
+          <a:fillRef idx="0">
+            <a:scrgbClr r="0" g="0" b="0"/>
+          </a:fillRef>
+          <a:effectRef idx="0">
+            <a:scrgbClr r="0" g="0" b="0"/>
+          </a:effectRef>
+          <a:fontRef idx="minor">
+            <a:schemeClr val="tx1"/>
+          </a:fontRef>
+        </p:style>
+      </p:cxnSp>
+      <p:cxnSp>
+        <p:nvCxnSpPr>
+          <p:cNvPr id="15" name="Connettore 2 14">
+            <a:extLst>
+              <a:ext uri="{FF2B5EF4-FFF2-40B4-BE49-F238E27FC236}">
+                <a16:creationId xmlns:a16="http://schemas.microsoft.com/office/drawing/2014/main" id="{445653FE-C9F3-1A13-1EC2-80AD3150309A}"/>
+              </a:ext>
+            </a:extLst>
+          </p:cNvPr>
+          <p:cNvCxnSpPr>
+            <a:cxnSpLocks/>
+            <a:stCxn id="5" idx="6"/>
+            <a:endCxn id="7" idx="2"/>
+          </p:cNvCxnSpPr>
+          <p:nvPr/>
+        </p:nvCxnSpPr>
+        <p:spPr>
+          <a:xfrm>
+            <a:off x="4247134" y="4615942"/>
+            <a:ext cx="2410968" cy="70104"/>
+          </a:xfrm>
+          <a:prstGeom prst="straightConnector1">
+            <a:avLst/>
+          </a:prstGeom>
+          <a:ln w="19050" cap="flat" cmpd="sng" algn="ctr">
+            <a:solidFill>
+              <a:schemeClr val="dk1"/>
+            </a:solidFill>
+            <a:prstDash val="solid"/>
+            <a:round/>
+            <a:headEnd type="arrow" w="med" len="med"/>
+            <a:tailEnd type="arrow" w="med" len="med"/>
+          </a:ln>
+        </p:spPr>
+        <p:style>
+          <a:lnRef idx="0">
+            <a:scrgbClr r="0" g="0" b="0"/>
+          </a:lnRef>
+          <a:fillRef idx="0">
+            <a:scrgbClr r="0" g="0" b="0"/>
+          </a:fillRef>
+          <a:effectRef idx="0">
+            <a:scrgbClr r="0" g="0" b="0"/>
+          </a:effectRef>
+          <a:fontRef idx="minor">
+            <a:schemeClr val="tx1"/>
+          </a:fontRef>
+        </p:style>
+      </p:cxnSp>
+      <p:cxnSp>
+        <p:nvCxnSpPr>
+          <p:cNvPr id="18" name="Connettore 2 17">
+            <a:extLst>
+              <a:ext uri="{FF2B5EF4-FFF2-40B4-BE49-F238E27FC236}">
+                <a16:creationId xmlns:a16="http://schemas.microsoft.com/office/drawing/2014/main" id="{1BF52C42-0B1F-0592-3BFE-46B805D1C6FD}"/>
+              </a:ext>
+            </a:extLst>
+          </p:cNvPr>
+          <p:cNvCxnSpPr>
+            <a:cxnSpLocks/>
+            <a:stCxn id="5" idx="5"/>
+            <a:endCxn id="8" idx="2"/>
+          </p:cNvCxnSpPr>
+          <p:nvPr/>
+        </p:nvCxnSpPr>
+        <p:spPr>
+          <a:xfrm>
+            <a:off x="4003416" y="4858409"/>
+            <a:ext cx="2654686" cy="894437"/>
+          </a:xfrm>
+          <a:prstGeom prst="straightConnector1">
+            <a:avLst/>
+          </a:prstGeom>
+          <a:ln w="19050" cap="flat" cmpd="sng" algn="ctr">
+            <a:solidFill>
+              <a:schemeClr val="dk1"/>
+            </a:solidFill>
+            <a:prstDash val="solid"/>
+            <a:round/>
+            <a:headEnd type="arrow" w="med" len="med"/>
+            <a:tailEnd type="arrow" w="med" len="med"/>
+          </a:ln>
+        </p:spPr>
+        <p:style>
+          <a:lnRef idx="0">
+            <a:scrgbClr r="0" g="0" b="0"/>
+          </a:lnRef>
+          <a:fillRef idx="0">
+            <a:scrgbClr r="0" g="0" b="0"/>
+          </a:fillRef>
+          <a:effectRef idx="0">
+            <a:scrgbClr r="0" g="0" b="0"/>
+          </a:effectRef>
+          <a:fontRef idx="minor">
+            <a:schemeClr val="tx1"/>
+          </a:fontRef>
+        </p:style>
+      </p:cxnSp>
+      <p:sp>
+        <p:nvSpPr>
+          <p:cNvPr id="21" name="TextBox 8">
+            <a:extLst>
+              <a:ext uri="{FF2B5EF4-FFF2-40B4-BE49-F238E27FC236}">
+                <a16:creationId xmlns:a16="http://schemas.microsoft.com/office/drawing/2014/main" id="{905B0782-8B3C-7F22-D775-F1B5ADE544D9}"/>
+              </a:ext>
+            </a:extLst>
+          </p:cNvPr>
+          <p:cNvSpPr txBox="1"/>
+          <p:nvPr/>
+        </p:nvSpPr>
+        <p:spPr>
+          <a:xfrm rot="20629816">
+            <a:off x="4637962" y="3661096"/>
+            <a:ext cx="1737451" cy="253916"/>
+          </a:xfrm>
+          <a:prstGeom prst="rect">
+            <a:avLst/>
+          </a:prstGeom>
+          <a:noFill/>
+        </p:spPr>
+        <p:txBody>
+          <a:bodyPr wrap="square" rtlCol="0">
+            <a:spAutoFit/>
+          </a:bodyPr>
+          <a:lstStyle/>
+          <a:p>
+            <a:r>
+              <a:rPr lang="it-IT" sz="1050" dirty="0"/>
+              <a:t>Query: DISCOVER HELLO</a:t>
+            </a:r>
+            <a:endParaRPr lang="en-GB" sz="1050" dirty="0"/>
+          </a:p>
+        </p:txBody>
+      </p:sp>
+      <p:sp>
+        <p:nvSpPr>
+          <p:cNvPr id="22" name="TextBox 8">
+            <a:extLst>
+              <a:ext uri="{FF2B5EF4-FFF2-40B4-BE49-F238E27FC236}">
+                <a16:creationId xmlns:a16="http://schemas.microsoft.com/office/drawing/2014/main" id="{43E21AAE-21B2-EC26-609E-F72ABCCA8E02}"/>
+              </a:ext>
+            </a:extLst>
+          </p:cNvPr>
+          <p:cNvSpPr txBox="1"/>
+          <p:nvPr/>
+        </p:nvSpPr>
+        <p:spPr>
+          <a:xfrm rot="20656093">
+            <a:off x="4769979" y="3899180"/>
+            <a:ext cx="1870630" cy="253916"/>
+          </a:xfrm>
+          <a:prstGeom prst="rect">
+            <a:avLst/>
+          </a:prstGeom>
+          <a:noFill/>
+        </p:spPr>
+        <p:txBody>
+          <a:bodyPr wrap="square" rtlCol="0">
+            <a:spAutoFit/>
+          </a:bodyPr>
+          <a:lstStyle/>
+          <a:p>
+            <a:r>
+              <a:rPr lang="it-IT" sz="1050" dirty="0"/>
+              <a:t>Resp: DISCOVER RESPONSE</a:t>
+            </a:r>
+            <a:endParaRPr lang="en-GB" sz="1050" dirty="0"/>
+          </a:p>
+        </p:txBody>
+      </p:sp>
+      <p:sp>
+        <p:nvSpPr>
+          <p:cNvPr id="23" name="TextBox 8">
+            <a:extLst>
+              <a:ext uri="{FF2B5EF4-FFF2-40B4-BE49-F238E27FC236}">
+                <a16:creationId xmlns:a16="http://schemas.microsoft.com/office/drawing/2014/main" id="{3E57B80C-E099-9569-09F5-81755831F876}"/>
+              </a:ext>
+            </a:extLst>
+          </p:cNvPr>
+          <p:cNvSpPr txBox="1"/>
+          <p:nvPr/>
+        </p:nvSpPr>
+        <p:spPr>
+          <a:xfrm rot="170227">
+            <a:off x="4688217" y="4389813"/>
+            <a:ext cx="1737451" cy="253916"/>
+          </a:xfrm>
+          <a:prstGeom prst="rect">
+            <a:avLst/>
+          </a:prstGeom>
+          <a:noFill/>
+        </p:spPr>
+        <p:txBody>
+          <a:bodyPr wrap="square" rtlCol="0">
+            <a:spAutoFit/>
+          </a:bodyPr>
+          <a:lstStyle/>
+          <a:p>
+            <a:r>
+              <a:rPr lang="it-IT" sz="1050" dirty="0"/>
+              <a:t>Query: DISCOVER HELLO</a:t>
+            </a:r>
+            <a:endParaRPr lang="en-GB" sz="1050" dirty="0"/>
+          </a:p>
+        </p:txBody>
+      </p:sp>
+      <p:sp>
+        <p:nvSpPr>
+          <p:cNvPr id="24" name="TextBox 8">
+            <a:extLst>
+              <a:ext uri="{FF2B5EF4-FFF2-40B4-BE49-F238E27FC236}">
+                <a16:creationId xmlns:a16="http://schemas.microsoft.com/office/drawing/2014/main" id="{96F28C96-6138-4FDF-257A-F5D58B80E6CF}"/>
+              </a:ext>
+            </a:extLst>
+          </p:cNvPr>
+          <p:cNvSpPr txBox="1"/>
+          <p:nvPr/>
+        </p:nvSpPr>
+        <p:spPr>
+          <a:xfrm rot="1099372">
+            <a:off x="4683985" y="5085449"/>
+            <a:ext cx="1737451" cy="253916"/>
+          </a:xfrm>
+          <a:prstGeom prst="rect">
+            <a:avLst/>
+          </a:prstGeom>
+          <a:noFill/>
+        </p:spPr>
+        <p:txBody>
+          <a:bodyPr wrap="square" rtlCol="0">
+            <a:spAutoFit/>
+          </a:bodyPr>
+          <a:lstStyle/>
+          <a:p>
+            <a:r>
+              <a:rPr lang="it-IT" sz="1050" dirty="0"/>
+              <a:t>Query: DISCOVER HELLO</a:t>
+            </a:r>
+            <a:endParaRPr lang="en-GB" sz="1050" dirty="0"/>
+          </a:p>
+        </p:txBody>
+      </p:sp>
+      <p:sp>
+        <p:nvSpPr>
+          <p:cNvPr id="25" name="TextBox 8">
+            <a:extLst>
+              <a:ext uri="{FF2B5EF4-FFF2-40B4-BE49-F238E27FC236}">
+                <a16:creationId xmlns:a16="http://schemas.microsoft.com/office/drawing/2014/main" id="{CE81058B-CB84-2B7A-C59A-6889C0D11D07}"/>
+              </a:ext>
+            </a:extLst>
+          </p:cNvPr>
+          <p:cNvSpPr txBox="1"/>
+          <p:nvPr/>
+        </p:nvSpPr>
+        <p:spPr>
+          <a:xfrm rot="150237">
+            <a:off x="4669211" y="4633024"/>
+            <a:ext cx="1870630" cy="253916"/>
+          </a:xfrm>
+          <a:prstGeom prst="rect">
+            <a:avLst/>
+          </a:prstGeom>
+          <a:noFill/>
+        </p:spPr>
+        <p:txBody>
+          <a:bodyPr wrap="square" rtlCol="0">
+            <a:spAutoFit/>
+          </a:bodyPr>
+          <a:lstStyle/>
+          <a:p>
+            <a:r>
+              <a:rPr lang="it-IT" sz="1050" dirty="0"/>
+              <a:t>Resp: DISCOVER RESPONSE</a:t>
+            </a:r>
+            <a:endParaRPr lang="en-GB" sz="1050" dirty="0"/>
+          </a:p>
+        </p:txBody>
+      </p:sp>
+      <p:sp>
+        <p:nvSpPr>
+          <p:cNvPr id="26" name="TextBox 8">
+            <a:extLst>
+              <a:ext uri="{FF2B5EF4-FFF2-40B4-BE49-F238E27FC236}">
+                <a16:creationId xmlns:a16="http://schemas.microsoft.com/office/drawing/2014/main" id="{EF9118FB-EB95-E523-3FA4-8A92BE497277}"/>
+              </a:ext>
+            </a:extLst>
+          </p:cNvPr>
+          <p:cNvSpPr txBox="1"/>
+          <p:nvPr/>
+        </p:nvSpPr>
+        <p:spPr>
+          <a:xfrm rot="1177318">
+            <a:off x="4558355" y="5350904"/>
+            <a:ext cx="1870630" cy="253916"/>
+          </a:xfrm>
+          <a:prstGeom prst="rect">
+            <a:avLst/>
+          </a:prstGeom>
+          <a:noFill/>
+        </p:spPr>
+        <p:txBody>
+          <a:bodyPr wrap="square" rtlCol="0">
+            <a:spAutoFit/>
+          </a:bodyPr>
+          <a:lstStyle/>
+          <a:p>
+            <a:r>
+              <a:rPr lang="it-IT" sz="1050" dirty="0"/>
+              <a:t>Resp: DISCOVER RESPONSE</a:t>
+            </a:r>
+            <a:endParaRPr lang="en-GB" sz="1050" dirty="0"/>
+          </a:p>
+        </p:txBody>
+      </p:sp>
+      <p:sp>
+        <p:nvSpPr>
+          <p:cNvPr id="27" name="TextBox 8">
+            <a:extLst>
+              <a:ext uri="{FF2B5EF4-FFF2-40B4-BE49-F238E27FC236}">
+                <a16:creationId xmlns:a16="http://schemas.microsoft.com/office/drawing/2014/main" id="{EA0E4086-0E1E-8784-09F9-54FE43BFDFC9}"/>
+              </a:ext>
+            </a:extLst>
+          </p:cNvPr>
+          <p:cNvSpPr txBox="1"/>
+          <p:nvPr/>
+        </p:nvSpPr>
+        <p:spPr>
+          <a:xfrm>
+            <a:off x="293218" y="909701"/>
+            <a:ext cx="11383670" cy="2004651"/>
+          </a:xfrm>
+          <a:prstGeom prst="rect">
+            <a:avLst/>
+          </a:prstGeom>
+          <a:noFill/>
+        </p:spPr>
+        <p:txBody>
+          <a:bodyPr wrap="square" rtlCol="0">
+            <a:spAutoFit/>
+          </a:bodyPr>
+          <a:lstStyle/>
+          <a:p>
+            <a:pPr marL="171450" indent="-171450">
+              <a:lnSpc>
+                <a:spcPct val="150000"/>
+              </a:lnSpc>
+              <a:buFont typeface="Arial" panose="020B0604020202020204" pitchFamily="34" charset="0"/>
+              <a:buChar char="•"/>
+            </a:pPr>
+            <a:r>
+              <a:rPr lang="en-GB" sz="1200" dirty="0"/>
+              <a:t>The </a:t>
+            </a:r>
+            <a:r>
+              <a:rPr lang="en-GB" sz="1200" i="1" dirty="0"/>
+              <a:t>Discover Protocol</a:t>
+            </a:r>
+            <a:r>
+              <a:rPr lang="en-GB" sz="1200" dirty="0"/>
+              <a:t> is used by the </a:t>
+            </a:r>
+            <a:r>
+              <a:rPr lang="en-GB" sz="1200" dirty="0" err="1"/>
+              <a:t>Qube</a:t>
+            </a:r>
+            <a:r>
+              <a:rPr lang="en-GB" sz="1200" dirty="0"/>
+              <a:t> Manager during the Discover State to search active </a:t>
+            </a:r>
+            <a:r>
+              <a:rPr lang="en-GB" sz="1200" dirty="0" err="1"/>
+              <a:t>Qube</a:t>
+            </a:r>
+            <a:r>
+              <a:rPr lang="en-GB" sz="1200" dirty="0"/>
+              <a:t> Worker in a subnet</a:t>
+            </a:r>
+          </a:p>
+          <a:p>
+            <a:pPr marL="171450" indent="-171450">
+              <a:lnSpc>
+                <a:spcPct val="150000"/>
+              </a:lnSpc>
+              <a:buFont typeface="Arial" panose="020B0604020202020204" pitchFamily="34" charset="0"/>
+              <a:buChar char="•"/>
+            </a:pPr>
+            <a:r>
+              <a:rPr lang="en-GB" sz="1200" dirty="0"/>
+              <a:t>It consists of a “two-handshake” protocol:</a:t>
+            </a:r>
+          </a:p>
+          <a:p>
+            <a:pPr marL="685800" lvl="1" indent="-228600">
+              <a:lnSpc>
+                <a:spcPct val="150000"/>
+              </a:lnSpc>
+              <a:buFont typeface="+mj-lt"/>
+              <a:buAutoNum type="arabicPeriod"/>
+            </a:pPr>
+            <a:r>
+              <a:rPr lang="en-GB" sz="1200" dirty="0"/>
+              <a:t>The </a:t>
+            </a:r>
+            <a:r>
+              <a:rPr lang="en-GB" sz="1200" dirty="0" err="1"/>
+              <a:t>Qube</a:t>
+            </a:r>
+            <a:r>
+              <a:rPr lang="en-GB" sz="1200" dirty="0"/>
+              <a:t> Manager sends to each address of the subnet a DISCOVER HELLO message</a:t>
+            </a:r>
+          </a:p>
+          <a:p>
+            <a:pPr marL="685800" lvl="1" indent="-228600">
+              <a:lnSpc>
+                <a:spcPct val="150000"/>
+              </a:lnSpc>
+              <a:buFont typeface="+mj-lt"/>
+              <a:buAutoNum type="arabicPeriod"/>
+            </a:pPr>
+            <a:r>
+              <a:rPr lang="en-GB" sz="1200" dirty="0"/>
+              <a:t>A </a:t>
+            </a:r>
+            <a:r>
+              <a:rPr lang="en-GB" sz="1200" dirty="0" err="1"/>
+              <a:t>Qube</a:t>
+            </a:r>
+            <a:r>
+              <a:rPr lang="en-GB" sz="1200" dirty="0"/>
+              <a:t> worker, if active, response with a DISCOVER RESPONSE message (containing some useful information)</a:t>
+            </a:r>
+          </a:p>
+          <a:p>
+            <a:pPr marL="685800" lvl="1" indent="-228600">
+              <a:lnSpc>
+                <a:spcPct val="150000"/>
+              </a:lnSpc>
+              <a:buFont typeface="+mj-lt"/>
+              <a:buAutoNum type="arabicPeriod"/>
+            </a:pPr>
+            <a:r>
+              <a:rPr lang="en-GB" sz="1200" dirty="0"/>
+              <a:t>When the </a:t>
+            </a:r>
+            <a:r>
+              <a:rPr lang="en-GB" sz="1200" dirty="0" err="1"/>
+              <a:t>Qube</a:t>
+            </a:r>
+            <a:r>
+              <a:rPr lang="en-GB" sz="1200" dirty="0"/>
+              <a:t> Manager has reached  the maximum number of nodes the protocol ends</a:t>
+            </a:r>
+          </a:p>
+          <a:p>
+            <a:pPr marL="228600" indent="-228600">
+              <a:lnSpc>
+                <a:spcPct val="150000"/>
+              </a:lnSpc>
+              <a:buFont typeface="Arial" panose="020B0604020202020204" pitchFamily="34" charset="0"/>
+              <a:buChar char="•"/>
+            </a:pPr>
+            <a:r>
+              <a:rPr lang="en-GB" sz="1200" dirty="0"/>
+              <a:t>DISCOVER HELLO and DISCOVER RESPONSE are both UDP Messages</a:t>
+            </a:r>
+          </a:p>
+          <a:p>
+            <a:pPr marL="228600" indent="-228600">
+              <a:lnSpc>
+                <a:spcPct val="150000"/>
+              </a:lnSpc>
+              <a:buFont typeface="Arial" panose="020B0604020202020204" pitchFamily="34" charset="0"/>
+              <a:buChar char="•"/>
+            </a:pPr>
+            <a:r>
+              <a:rPr lang="en-GB" sz="1200" dirty="0"/>
+              <a:t>The </a:t>
+            </a:r>
+            <a:r>
+              <a:rPr lang="en-GB" sz="1200" dirty="0" err="1"/>
+              <a:t>Qube</a:t>
+            </a:r>
+            <a:r>
+              <a:rPr lang="en-GB" sz="1200" dirty="0"/>
+              <a:t> Manager enters this protocol whenever the total number of active worker is below a threshold</a:t>
+            </a:r>
+          </a:p>
+        </p:txBody>
+      </p:sp>
+    </p:spTree>
+    <p:extLst>
+      <p:ext uri="{BB962C8B-B14F-4D97-AF65-F5344CB8AC3E}">
+        <p14:creationId xmlns:p14="http://schemas.microsoft.com/office/powerpoint/2010/main" val="412972717"/>
       </p:ext>
     </p:extLst>
   </p:cSld>

</xml_diff>